<commit_message>
Github actions automatic build - 2021-04-26 07:54
</commit_message>
<xml_diff>
--- a/powerpoint/SlideDeck1.pptx
+++ b/powerpoint/SlideDeck1.pptx
@@ -146,22 +146,45 @@
   <pc:docChgLst>
     <pc:chgData name="Bart Naudts" userId="1439a2f6791640ec" providerId="LiveId" clId="{CAF2192B-6F1F-294E-AB18-06BD1A5CD87B}"/>
     <pc:docChg chg="undo custSel modSld sldOrd">
-      <pc:chgData name="Bart Naudts" userId="1439a2f6791640ec" providerId="LiveId" clId="{CAF2192B-6F1F-294E-AB18-06BD1A5CD87B}" dt="2021-03-24T15:46:07.439" v="2125" actId="20577"/>
+      <pc:chgData name="Bart Naudts" userId="1439a2f6791640ec" providerId="LiveId" clId="{CAF2192B-6F1F-294E-AB18-06BD1A5CD87B}" dt="2021-04-26T06:15:49.554" v="2151" actId="20577"/>
       <pc:docMkLst>
         <pc:docMk/>
       </pc:docMkLst>
       <pc:sldChg chg="modSp mod">
-        <pc:chgData name="Bart Naudts" userId="1439a2f6791640ec" providerId="LiveId" clId="{CAF2192B-6F1F-294E-AB18-06BD1A5CD87B}" dt="2021-03-24T15:46:07.439" v="2125" actId="20577"/>
+        <pc:chgData name="Bart Naudts" userId="1439a2f6791640ec" providerId="LiveId" clId="{CAF2192B-6F1F-294E-AB18-06BD1A5CD87B}" dt="2021-04-26T06:14:29.107" v="2146" actId="114"/>
         <pc:sldMkLst>
           <pc:docMk/>
           <pc:sldMk cId="2938719510" sldId="256"/>
         </pc:sldMkLst>
+        <pc:spChg chg="mod">
+          <ac:chgData name="Bart Naudts" userId="1439a2f6791640ec" providerId="LiveId" clId="{CAF2192B-6F1F-294E-AB18-06BD1A5CD87B}" dt="2021-04-26T06:14:29.107" v="2146" actId="114"/>
+          <ac:spMkLst>
+            <pc:docMk/>
+            <pc:sldMk cId="2938719510" sldId="256"/>
+            <ac:spMk id="2" creationId="{8400D348-059E-B648-B39D-3C8BD492DABA}"/>
+          </ac:spMkLst>
+        </pc:spChg>
         <pc:spChg chg="mod">
           <ac:chgData name="Bart Naudts" userId="1439a2f6791640ec" providerId="LiveId" clId="{CAF2192B-6F1F-294E-AB18-06BD1A5CD87B}" dt="2021-03-24T15:46:07.439" v="2125" actId="20577"/>
           <ac:spMkLst>
             <pc:docMk/>
             <pc:sldMk cId="2938719510" sldId="256"/>
             <ac:spMk id="3" creationId="{72428F1F-AD2A-A146-AC14-DFAE47526FDC}"/>
+          </ac:spMkLst>
+        </pc:spChg>
+      </pc:sldChg>
+      <pc:sldChg chg="modSp mod">
+        <pc:chgData name="Bart Naudts" userId="1439a2f6791640ec" providerId="LiveId" clId="{CAF2192B-6F1F-294E-AB18-06BD1A5CD87B}" dt="2021-04-26T06:14:17.153" v="2139" actId="114"/>
+        <pc:sldMkLst>
+          <pc:docMk/>
+          <pc:sldMk cId="1851960347" sldId="257"/>
+        </pc:sldMkLst>
+        <pc:spChg chg="mod">
+          <ac:chgData name="Bart Naudts" userId="1439a2f6791640ec" providerId="LiveId" clId="{CAF2192B-6F1F-294E-AB18-06BD1A5CD87B}" dt="2021-04-26T06:14:17.153" v="2139" actId="114"/>
+          <ac:spMkLst>
+            <pc:docMk/>
+            <pc:sldMk cId="1851960347" sldId="257"/>
+            <ac:spMk id="2" creationId="{A6756F90-B85A-5741-A818-A6B558AE7A0A}"/>
           </ac:spMkLst>
         </pc:spChg>
       </pc:sldChg>
@@ -196,13 +219,13 @@
         </pc:spChg>
       </pc:sldChg>
       <pc:sldChg chg="modSp mod">
-        <pc:chgData name="Bart Naudts" userId="1439a2f6791640ec" providerId="LiveId" clId="{CAF2192B-6F1F-294E-AB18-06BD1A5CD87B}" dt="2021-03-15T21:02:33.753" v="74" actId="21"/>
+        <pc:chgData name="Bart Naudts" userId="1439a2f6791640ec" providerId="LiveId" clId="{CAF2192B-6F1F-294E-AB18-06BD1A5CD87B}" dt="2021-04-26T06:14:00.072" v="2132" actId="114"/>
         <pc:sldMkLst>
           <pc:docMk/>
           <pc:sldMk cId="2026024247" sldId="261"/>
         </pc:sldMkLst>
         <pc:spChg chg="mod">
-          <ac:chgData name="Bart Naudts" userId="1439a2f6791640ec" providerId="LiveId" clId="{CAF2192B-6F1F-294E-AB18-06BD1A5CD87B}" dt="2021-03-15T21:01:38.867" v="71" actId="20577"/>
+          <ac:chgData name="Bart Naudts" userId="1439a2f6791640ec" providerId="LiveId" clId="{CAF2192B-6F1F-294E-AB18-06BD1A5CD87B}" dt="2021-04-26T06:14:00.072" v="2132" actId="114"/>
           <ac:spMkLst>
             <pc:docMk/>
             <pc:sldMk cId="2026024247" sldId="261"/>
@@ -295,13 +318,13 @@
         </pc:spChg>
       </pc:sldChg>
       <pc:sldChg chg="modSp mod">
-        <pc:chgData name="Bart Naudts" userId="1439a2f6791640ec" providerId="LiveId" clId="{CAF2192B-6F1F-294E-AB18-06BD1A5CD87B}" dt="2021-03-15T21:08:39.769" v="311" actId="20577"/>
+        <pc:chgData name="Bart Naudts" userId="1439a2f6791640ec" providerId="LiveId" clId="{CAF2192B-6F1F-294E-AB18-06BD1A5CD87B}" dt="2021-04-26T06:15:49.554" v="2151" actId="20577"/>
         <pc:sldMkLst>
           <pc:docMk/>
           <pc:sldMk cId="2219509717" sldId="266"/>
         </pc:sldMkLst>
         <pc:spChg chg="mod">
-          <ac:chgData name="Bart Naudts" userId="1439a2f6791640ec" providerId="LiveId" clId="{CAF2192B-6F1F-294E-AB18-06BD1A5CD87B}" dt="2021-03-15T21:08:39.769" v="311" actId="20577"/>
+          <ac:chgData name="Bart Naudts" userId="1439a2f6791640ec" providerId="LiveId" clId="{CAF2192B-6F1F-294E-AB18-06BD1A5CD87B}" dt="2021-04-26T06:15:49.554" v="2151" actId="20577"/>
           <ac:spMkLst>
             <pc:docMk/>
             <pc:sldMk cId="2219509717" sldId="266"/>
@@ -621,7 +644,7 @@
           <a:p>
             <a:fld id="{139140B8-3B78-2149-9DFE-CC3FBE7760E8}" type="datetimeFigureOut">
               <a:rPr lang="en-BE" smtClean="0"/>
-              <a:t>24/03/2021</a:t>
+              <a:t>26/04/2021</a:t>
             </a:fld>
             <a:endParaRPr lang="en-BE"/>
           </a:p>
@@ -821,7 +844,7 @@
           <a:p>
             <a:fld id="{139140B8-3B78-2149-9DFE-CC3FBE7760E8}" type="datetimeFigureOut">
               <a:rPr lang="en-BE" smtClean="0"/>
-              <a:t>24/03/2021</a:t>
+              <a:t>26/04/2021</a:t>
             </a:fld>
             <a:endParaRPr lang="en-BE"/>
           </a:p>
@@ -1031,7 +1054,7 @@
           <a:p>
             <a:fld id="{139140B8-3B78-2149-9DFE-CC3FBE7760E8}" type="datetimeFigureOut">
               <a:rPr lang="en-BE" smtClean="0"/>
-              <a:t>24/03/2021</a:t>
+              <a:t>26/04/2021</a:t>
             </a:fld>
             <a:endParaRPr lang="en-BE"/>
           </a:p>
@@ -1231,7 +1254,7 @@
           <a:p>
             <a:fld id="{139140B8-3B78-2149-9DFE-CC3FBE7760E8}" type="datetimeFigureOut">
               <a:rPr lang="en-BE" smtClean="0"/>
-              <a:t>24/03/2021</a:t>
+              <a:t>26/04/2021</a:t>
             </a:fld>
             <a:endParaRPr lang="en-BE"/>
           </a:p>
@@ -1507,7 +1530,7 @@
           <a:p>
             <a:fld id="{139140B8-3B78-2149-9DFE-CC3FBE7760E8}" type="datetimeFigureOut">
               <a:rPr lang="en-BE" smtClean="0"/>
-              <a:t>24/03/2021</a:t>
+              <a:t>26/04/2021</a:t>
             </a:fld>
             <a:endParaRPr lang="en-BE"/>
           </a:p>
@@ -1775,7 +1798,7 @@
           <a:p>
             <a:fld id="{139140B8-3B78-2149-9DFE-CC3FBE7760E8}" type="datetimeFigureOut">
               <a:rPr lang="en-BE" smtClean="0"/>
-              <a:t>24/03/2021</a:t>
+              <a:t>26/04/2021</a:t>
             </a:fld>
             <a:endParaRPr lang="en-BE"/>
           </a:p>
@@ -2190,7 +2213,7 @@
           <a:p>
             <a:fld id="{139140B8-3B78-2149-9DFE-CC3FBE7760E8}" type="datetimeFigureOut">
               <a:rPr lang="en-BE" smtClean="0"/>
-              <a:t>24/03/2021</a:t>
+              <a:t>26/04/2021</a:t>
             </a:fld>
             <a:endParaRPr lang="en-BE"/>
           </a:p>
@@ -2332,7 +2355,7 @@
           <a:p>
             <a:fld id="{139140B8-3B78-2149-9DFE-CC3FBE7760E8}" type="datetimeFigureOut">
               <a:rPr lang="en-BE" smtClean="0"/>
-              <a:t>24/03/2021</a:t>
+              <a:t>26/04/2021</a:t>
             </a:fld>
             <a:endParaRPr lang="en-BE"/>
           </a:p>
@@ -2445,7 +2468,7 @@
           <a:p>
             <a:fld id="{139140B8-3B78-2149-9DFE-CC3FBE7760E8}" type="datetimeFigureOut">
               <a:rPr lang="en-BE" smtClean="0"/>
-              <a:t>24/03/2021</a:t>
+              <a:t>26/04/2021</a:t>
             </a:fld>
             <a:endParaRPr lang="en-BE"/>
           </a:p>
@@ -2758,7 +2781,7 @@
           <a:p>
             <a:fld id="{139140B8-3B78-2149-9DFE-CC3FBE7760E8}" type="datetimeFigureOut">
               <a:rPr lang="en-BE" smtClean="0"/>
-              <a:t>24/03/2021</a:t>
+              <a:t>26/04/2021</a:t>
             </a:fld>
             <a:endParaRPr lang="en-BE"/>
           </a:p>
@@ -3047,7 +3070,7 @@
           <a:p>
             <a:fld id="{139140B8-3B78-2149-9DFE-CC3FBE7760E8}" type="datetimeFigureOut">
               <a:rPr lang="en-BE" smtClean="0"/>
-              <a:t>24/03/2021</a:t>
+              <a:t>26/04/2021</a:t>
             </a:fld>
             <a:endParaRPr lang="en-BE"/>
           </a:p>
@@ -3290,7 +3313,7 @@
           <a:p>
             <a:fld id="{139140B8-3B78-2149-9DFE-CC3FBE7760E8}" type="datetimeFigureOut">
               <a:rPr lang="en-BE" smtClean="0"/>
-              <a:t>24/03/2021</a:t>
+              <a:t>26/04/2021</a:t>
             </a:fld>
             <a:endParaRPr lang="en-BE"/>
           </a:p>
@@ -3731,8 +3754,8 @@
           <a:lstStyle/>
           <a:p>
             <a:r>
-              <a:rPr lang="en-BE" dirty="0"/>
-              <a:t>E2IMMU</a:t>
+              <a:rPr lang="en-BE" i="1" dirty="0"/>
+              <a:t>e2immu</a:t>
             </a:r>
             <a:br>
               <a:rPr lang="en-BE" dirty="0"/>
@@ -3911,7 +3934,7 @@
           <a:p>
             <a:r>
               <a:rPr lang="en-BE" dirty="0"/>
-              <a:t>The majority of classes in your project should be containers</a:t>
+              <a:t>The majority of types in your project should be containers</a:t>
             </a:r>
           </a:p>
         </p:txBody>
@@ -5174,7 +5197,15 @@
           <a:p>
             <a:r>
               <a:rPr lang="en-BE" dirty="0"/>
-              <a:t>What is E2IMMU?</a:t>
+              <a:t>What is </a:t>
+            </a:r>
+            <a:r>
+              <a:rPr lang="en-BE" i="1" dirty="0"/>
+              <a:t>e2immu</a:t>
+            </a:r>
+            <a:r>
+              <a:rPr lang="en-BE" dirty="0"/>
+              <a:t>?</a:t>
             </a:r>
           </a:p>
         </p:txBody>
@@ -6232,7 +6263,15 @@
           <a:p>
             <a:r>
               <a:rPr lang="en-BE" dirty="0"/>
-              <a:t>Does E2IMMU do typical analyser stuff?</a:t>
+              <a:t>Does </a:t>
+            </a:r>
+            <a:r>
+              <a:rPr lang="en-BE" i="1" dirty="0"/>
+              <a:t>e2immu</a:t>
+            </a:r>
+            <a:r>
+              <a:rPr lang="en-BE" dirty="0"/>
+              <a:t> do typical analyser stuff?</a:t>
             </a:r>
           </a:p>
         </p:txBody>

</xml_diff>